<commit_message>
Update Actionable Email Dashboard screenshot and url
</commit_message>
<xml_diff>
--- a/ConnectorActionableMsgs/03 Adaptive Cards/03 Handling Actions.pptx
+++ b/ConnectorActionableMsgs/03 Adaptive Cards/03 Handling Actions.pptx
@@ -263,7 +263,7 @@
               <a:rPr lang="en-US" smtClean="0">
                 <a:latin typeface="Segoe UI" pitchFamily="34" charset="0"/>
               </a:rPr>
-              <a:t>9/28/18 2:15 PM</a:t>
+              <a:t>12/17/2018 10:47 AM</a:t>
             </a:fld>
             <a:endParaRPr lang="en-US" dirty="0">
               <a:latin typeface="Segoe UI" pitchFamily="34" charset="0"/>
@@ -557,7 +557,7 @@
           <a:p>
             <a:fld id="{D18B56EA-E28F-4F92-9F16-7A6F2501B303}" type="datetime8">
               <a:rPr lang="en-US" smtClean="0"/>
-              <a:t>9/28/18 2:15 PM</a:t>
+              <a:t>12/17/2018 10:47 AM</a:t>
             </a:fld>
             <a:endParaRPr lang="en-US" dirty="0"/>
           </a:p>
@@ -1045,7 +1045,7 @@
                 <a:tabLst/>
                 <a:defRPr/>
               </a:pPr>
-              <a:t>9/28/18 2:15 PM</a:t>
+              <a:t>12/17/2018 10:47 AM</a:t>
             </a:fld>
             <a:endParaRPr kumimoji="0" lang="en-US" sz="1200" b="0" i="0" u="none" strike="noStrike" kern="1200" cap="none" spc="0" normalizeH="0" baseline="0" noProof="0" dirty="0">
               <a:ln>
@@ -1343,7 +1343,7 @@
           <a:p>
             <a:fld id="{D18B56EA-E28F-4F92-9F16-7A6F2501B303}" type="datetime8">
               <a:rPr lang="en-US" smtClean="0"/>
-              <a:t>9/28/18 2:15 PM</a:t>
+              <a:t>12/17/2018 10:47 AM</a:t>
             </a:fld>
             <a:endParaRPr lang="en-US" dirty="0"/>
           </a:p>
@@ -1524,7 +1524,7 @@
           <a:p>
             <a:fld id="{D18B56EA-E28F-4F92-9F16-7A6F2501B303}" type="datetime8">
               <a:rPr lang="en-US" smtClean="0"/>
-              <a:t>9/28/18 2:15 PM</a:t>
+              <a:t>12/17/2018 10:47 AM</a:t>
             </a:fld>
             <a:endParaRPr lang="en-US" dirty="0"/>
           </a:p>
@@ -1705,7 +1705,7 @@
           <a:p>
             <a:fld id="{D18B56EA-E28F-4F92-9F16-7A6F2501B303}" type="datetime8">
               <a:rPr lang="en-US" smtClean="0"/>
-              <a:t>9/28/18 2:15 PM</a:t>
+              <a:t>12/17/2018 10:47 AM</a:t>
             </a:fld>
             <a:endParaRPr lang="en-US" dirty="0"/>
           </a:p>
@@ -1886,7 +1886,7 @@
           <a:p>
             <a:fld id="{D18B56EA-E28F-4F92-9F16-7A6F2501B303}" type="datetime8">
               <a:rPr lang="en-US" smtClean="0"/>
-              <a:t>9/28/18 2:15 PM</a:t>
+              <a:t>12/17/2018 10:47 AM</a:t>
             </a:fld>
             <a:endParaRPr lang="en-US" dirty="0"/>
           </a:p>
@@ -2172,7 +2172,7 @@
                 <a:tabLst/>
                 <a:defRPr/>
               </a:pPr>
-              <a:t>9/28/18 2:15 PM</a:t>
+              <a:t>12/17/2018 10:47 AM</a:t>
             </a:fld>
             <a:endParaRPr kumimoji="0" lang="en-US" sz="1200" b="0" i="0" u="none" strike="noStrike" kern="1200" cap="none" spc="0" normalizeH="0" baseline="0" noProof="0" dirty="0">
               <a:ln>
@@ -2526,7 +2526,7 @@
           <a:p>
             <a:fld id="{D18B56EA-E28F-4F92-9F16-7A6F2501B303}" type="datetime8">
               <a:rPr lang="en-US" smtClean="0"/>
-              <a:t>9/28/18 2:15 PM</a:t>
+              <a:t>12/17/2018 10:50 AM</a:t>
             </a:fld>
             <a:endParaRPr lang="en-US" dirty="0"/>
           </a:p>
@@ -2812,7 +2812,7 @@
           <a:p>
             <a:fld id="{D18B56EA-E28F-4F92-9F16-7A6F2501B303}" type="datetime8">
               <a:rPr lang="en-US" smtClean="0"/>
-              <a:t>9/28/18 2:15 PM</a:t>
+              <a:t>12/17/2018 10:50 AM</a:t>
             </a:fld>
             <a:endParaRPr lang="en-US" dirty="0"/>
           </a:p>
@@ -3073,7 +3073,7 @@
           <a:p>
             <a:fld id="{D18B56EA-E28F-4F92-9F16-7A6F2501B303}" type="datetime8">
               <a:rPr lang="en-US" smtClean="0"/>
-              <a:t>9/28/18 2:15 PM</a:t>
+              <a:t>12/17/2018 10:47 AM</a:t>
             </a:fld>
             <a:endParaRPr lang="en-US" dirty="0"/>
           </a:p>
@@ -3310,7 +3310,7 @@
           <a:p>
             <a:fld id="{D18B56EA-E28F-4F92-9F16-7A6F2501B303}" type="datetime8">
               <a:rPr lang="en-US" smtClean="0"/>
-              <a:t>9/28/18 2:15 PM</a:t>
+              <a:t>12/17/2018 10:47 AM</a:t>
             </a:fld>
             <a:endParaRPr lang="en-US" dirty="0"/>
           </a:p>
@@ -3608,7 +3608,7 @@
                 <a:tabLst/>
                 <a:defRPr/>
               </a:pPr>
-              <a:t>9/28/18 2:15 PM</a:t>
+              <a:t>12/17/2018 10:47 AM</a:t>
             </a:fld>
             <a:endParaRPr kumimoji="0" lang="en-US" sz="1200" b="0" i="0" u="none" strike="noStrike" kern="1200" cap="none" spc="0" normalizeH="0" baseline="0" noProof="0" dirty="0">
               <a:ln>
@@ -3969,7 +3969,7 @@
                 <a:tabLst/>
                 <a:defRPr/>
               </a:pPr>
-              <a:t>9/28/18 2:15 PM</a:t>
+              <a:t>12/17/2018 10:47 AM</a:t>
             </a:fld>
             <a:endParaRPr kumimoji="0" lang="en-US" sz="1200" b="0" i="0" u="none" strike="noStrike" kern="1200" cap="none" spc="0" normalizeH="0" baseline="0" noProof="0" dirty="0">
               <a:ln>
@@ -4407,7 +4407,7 @@
                 <a:tabLst/>
                 <a:defRPr/>
               </a:pPr>
-              <a:t>9/28/18 2:15 PM</a:t>
+              <a:t>12/17/2018 10:47 AM</a:t>
             </a:fld>
             <a:endParaRPr kumimoji="0" lang="en-US" sz="1200" b="0" i="0" u="none" strike="noStrike" kern="1200" cap="none" spc="0" normalizeH="0" baseline="0" noProof="0" dirty="0">
               <a:ln>
@@ -15698,7 +15698,7 @@
         <p:spPr>
           <a:xfrm>
             <a:off x="465139" y="1857976"/>
-            <a:ext cx="4731894" cy="4265783"/>
+            <a:ext cx="4731894" cy="2917722"/>
           </a:xfrm>
           <a:prstGeom prst="rect">
             <a:avLst/>
@@ -15949,89 +15949,7 @@
                 </a:solidFill>
                 <a:latin typeface="Segoe UI Semibold"/>
               </a:rPr>
-              <a:t>OpenUri</a:t>
-            </a:r>
-            <a:r>
-              <a:rPr lang="en-US" sz="1600" b="0" dirty="0">
-                <a:solidFill>
-                  <a:srgbClr val="2F2F2F"/>
-                </a:solidFill>
-                <a:latin typeface="Segoe UI Semibold"/>
-              </a:rPr>
-              <a:t> action allows device-specific targeting </a:t>
-            </a:r>
-            <a:br>
-              <a:rPr lang="en-US" sz="1600" b="0" dirty="0">
-                <a:solidFill>
-                  <a:srgbClr val="2F2F2F"/>
-                </a:solidFill>
-                <a:latin typeface="Segoe UI Semibold"/>
-              </a:rPr>
-            </a:br>
-            <a:r>
-              <a:rPr lang="en-US" sz="1600" b="0" dirty="0">
-                <a:solidFill>
-                  <a:srgbClr val="2F2F2F"/>
-                </a:solidFill>
-                <a:latin typeface="Segoe UI Semibold"/>
-              </a:rPr>
-              <a:t>of URLs</a:t>
-            </a:r>
-          </a:p>
-          <a:p>
-            <a:pPr lvl="0">
-              <a:lnSpc>
-                <a:spcPct val="90000"/>
-              </a:lnSpc>
-              <a:spcBef>
-                <a:spcPts val="1800"/>
-              </a:spcBef>
-            </a:pPr>
-            <a:r>
-              <a:rPr lang="en-US" sz="1600" b="0" dirty="0">
-                <a:solidFill>
-                  <a:srgbClr val="2F2F2F"/>
-                </a:solidFill>
-                <a:latin typeface="Segoe UI Semibold"/>
-              </a:rPr>
-              <a:t>Default OS behavior for </a:t>
-            </a:r>
-            <a:r>
-              <a:rPr lang="en-US" sz="1600" b="0" dirty="0" err="1">
-                <a:solidFill>
-                  <a:srgbClr val="2F2F2F"/>
-                </a:solidFill>
-                <a:latin typeface="Segoe UI Semibold"/>
-              </a:rPr>
-              <a:t>OpenUri</a:t>
-            </a:r>
-            <a:r>
-              <a:rPr lang="en-US" sz="1600" b="0" dirty="0">
-                <a:solidFill>
-                  <a:srgbClr val="2F2F2F"/>
-                </a:solidFill>
-                <a:latin typeface="Segoe UI Semibold"/>
-              </a:rPr>
-              <a:t> action is to typically open a browser</a:t>
-            </a:r>
-          </a:p>
-          <a:p>
-            <a:pPr lvl="0">
-              <a:lnSpc>
-                <a:spcPct val="90000"/>
-              </a:lnSpc>
-              <a:spcBef>
-                <a:spcPts val="1800"/>
-              </a:spcBef>
-            </a:pPr>
-            <a:r>
-              <a:rPr lang="en-US" sz="1600" b="0" dirty="0" err="1">
-                <a:solidFill>
-                  <a:srgbClr val="2F2F2F"/>
-                </a:solidFill>
-                <a:latin typeface="Segoe UI Semibold"/>
-              </a:rPr>
-              <a:t>HttpPOST</a:t>
+              <a:t>Action.Http</a:t>
             </a:r>
             <a:r>
               <a:rPr lang="en-US" sz="1600" b="0" dirty="0">
@@ -16952,8 +16870,8 @@
         </p:nvSpPr>
         <p:spPr>
           <a:xfrm>
-            <a:off x="3032878" y="5843435"/>
-            <a:ext cx="6370718" cy="369332"/>
+            <a:off x="4763255" y="5843435"/>
+            <a:ext cx="2909964" cy="369332"/>
           </a:xfrm>
           <a:prstGeom prst="rect">
             <a:avLst/>
@@ -16972,7 +16890,7 @@
                   <a:schemeClr val="bg2"/>
                 </a:solidFill>
               </a:rPr>
-              <a:t>https://outlook.office.com/connectors/home/login/#/publish</a:t>
+              <a:t>https://aka.ms/publishoam</a:t>
             </a:r>
           </a:p>
         </p:txBody>
@@ -17005,6 +16923,35 @@
           </a:p>
         </p:txBody>
       </p:sp>
+      <p:pic>
+        <p:nvPicPr>
+          <p:cNvPr id="5" name="Picture 4">
+            <a:extLst>
+              <a:ext uri="{FF2B5EF4-FFF2-40B4-BE49-F238E27FC236}">
+                <a16:creationId xmlns:a16="http://schemas.microsoft.com/office/drawing/2014/main" id="{EC81B17D-9FCA-4199-9DCD-57E82EC036C2}"/>
+              </a:ext>
+            </a:extLst>
+          </p:cNvPr>
+          <p:cNvPicPr>
+            <a:picLocks noChangeAspect="1"/>
+          </p:cNvPicPr>
+          <p:nvPr/>
+        </p:nvPicPr>
+        <p:blipFill rotWithShape="1">
+          <a:blip r:embed="rId5"/>
+          <a:srcRect l="13907" r="25007" b="26081"/>
+          <a:stretch/>
+        </p:blipFill>
+        <p:spPr>
+          <a:xfrm>
+            <a:off x="1996572" y="1557689"/>
+            <a:ext cx="8412217" cy="4215314"/>
+          </a:xfrm>
+          <a:prstGeom prst="rect">
+            <a:avLst/>
+          </a:prstGeom>
+        </p:spPr>
+      </p:pic>
     </p:spTree>
     <p:extLst>
       <p:ext uri="{BB962C8B-B14F-4D97-AF65-F5344CB8AC3E}">
@@ -17566,7 +17513,7 @@
         <p:spPr>
           <a:xfrm>
             <a:off x="289937" y="6041423"/>
-            <a:ext cx="11410303" cy="572464"/>
+            <a:ext cx="10417980" cy="572464"/>
           </a:xfrm>
           <a:prstGeom prst="rect">
             <a:avLst/>
@@ -17594,7 +17541,7 @@
                 </a:solidFill>
                 <a:latin typeface="+mj-lt"/>
               </a:rPr>
-              <a:t>https://docs.microsoft.com/outlook/actionable-messages/actionable-email-dev-dashboard</a:t>
+              <a:t>https://docs.microsoft.com/en-us/outlook/actionable-messages/email-dev-dashboard</a:t>
             </a:r>
           </a:p>
         </p:txBody>
@@ -23253,7 +23200,7 @@
                   <a:srgbClr val="2F2F2F"/>
                 </a:solidFill>
               </a:rPr>
-              <a:t>Microsoft.O365.ActionableMessages.Authentication.ActionableMessageTokenValidator</a:t>
+              <a:t>Microsoft.O365.ActionableMessages.Utilities.ActionableMessageTokenValidator</a:t>
             </a:r>
           </a:p>
           <a:p>

</xml_diff>